<commit_message>
Small changes to meeting ppt
</commit_message>
<xml_diff>
--- a/Meeting Presentations/15.09.2022_ML Meeting.pptx
+++ b/Meeting Presentations/15.09.2022_ML Meeting.pptx
@@ -6983,7 +6983,430 @@
           </a:bodyPr>
           <a:lstStyle/>
           <a:p>
-            <a:endParaRPr lang="en-GB" sz="2000" dirty="0"/>
+            <a:r>
+              <a:rPr lang="nb-NO" sz="2000" dirty="0"/>
+              <a:t>In </a:t>
+            </a:r>
+            <a:r>
+              <a:rPr lang="nb-NO" sz="2000" dirty="0" err="1"/>
+              <a:t>the</a:t>
+            </a:r>
+            <a:r>
+              <a:rPr lang="nb-NO" sz="2000" dirty="0"/>
+              <a:t> </a:t>
+            </a:r>
+            <a:r>
+              <a:rPr lang="nb-NO" sz="2000" dirty="0" err="1"/>
+              <a:t>control</a:t>
+            </a:r>
+            <a:r>
+              <a:rPr lang="nb-NO" sz="2000" dirty="0"/>
+              <a:t> file </a:t>
+            </a:r>
+            <a:r>
+              <a:rPr lang="nb-NO" sz="2000" dirty="0" err="1"/>
+              <a:t>will</a:t>
+            </a:r>
+            <a:r>
+              <a:rPr lang="nb-NO" sz="2000" dirty="0"/>
+              <a:t> be:</a:t>
+            </a:r>
+          </a:p>
+          <a:p>
+            <a:pPr lvl="1"/>
+            <a:r>
+              <a:rPr lang="nb-NO" sz="1600" dirty="0"/>
+              <a:t>‘settings’ : </a:t>
+            </a:r>
+            <a:r>
+              <a:rPr lang="nb-NO" sz="1600" i="1" dirty="0" err="1"/>
+              <a:t>dict</a:t>
+            </a:r>
+            <a:endParaRPr lang="nb-NO" sz="1600" i="1" dirty="0"/>
+          </a:p>
+          <a:p>
+            <a:pPr lvl="2"/>
+            <a:r>
+              <a:rPr lang="nb-NO" sz="1200" dirty="0" err="1"/>
+              <a:t>Contains</a:t>
+            </a:r>
+            <a:r>
+              <a:rPr lang="nb-NO" sz="1200" dirty="0"/>
+              <a:t> </a:t>
+            </a:r>
+            <a:r>
+              <a:rPr lang="nb-NO" sz="1200" dirty="0" err="1"/>
+              <a:t>the</a:t>
+            </a:r>
+            <a:r>
+              <a:rPr lang="nb-NO" sz="1200" dirty="0"/>
+              <a:t> settings used for </a:t>
+            </a:r>
+            <a:r>
+              <a:rPr lang="nb-NO" sz="1200" dirty="0" err="1"/>
+              <a:t>that</a:t>
+            </a:r>
+            <a:r>
+              <a:rPr lang="nb-NO" sz="1200" dirty="0"/>
+              <a:t> </a:t>
+            </a:r>
+            <a:r>
+              <a:rPr lang="nb-NO" sz="1200" dirty="0" err="1"/>
+              <a:t>particular</a:t>
+            </a:r>
+            <a:r>
+              <a:rPr lang="nb-NO" sz="1200" dirty="0"/>
+              <a:t> </a:t>
+            </a:r>
+            <a:r>
+              <a:rPr lang="nb-NO" sz="1200" dirty="0" err="1"/>
+              <a:t>model</a:t>
+            </a:r>
+            <a:endParaRPr lang="nb-NO" sz="1200" dirty="0"/>
+          </a:p>
+          <a:p>
+            <a:pPr lvl="1"/>
+            <a:r>
+              <a:rPr lang="nb-NO" sz="1600" dirty="0"/>
+              <a:t>‘</a:t>
+            </a:r>
+            <a:r>
+              <a:rPr lang="nb-NO" sz="1600" dirty="0" err="1"/>
+              <a:t>summary_stats</a:t>
+            </a:r>
+            <a:r>
+              <a:rPr lang="nb-NO" sz="1600" dirty="0"/>
+              <a:t>’ : </a:t>
+            </a:r>
+            <a:r>
+              <a:rPr lang="nb-NO" sz="1600" i="1" dirty="0" err="1"/>
+              <a:t>dict</a:t>
+            </a:r>
+            <a:endParaRPr lang="nb-NO" sz="1600" i="1" dirty="0"/>
+          </a:p>
+          <a:p>
+            <a:pPr lvl="2"/>
+            <a:r>
+              <a:rPr lang="nb-NO" sz="1200" dirty="0" err="1"/>
+              <a:t>Contains</a:t>
+            </a:r>
+            <a:r>
+              <a:rPr lang="nb-NO" sz="1200" dirty="0"/>
+              <a:t> </a:t>
+            </a:r>
+            <a:r>
+              <a:rPr lang="nb-NO" sz="1200" dirty="0" err="1"/>
+              <a:t>the</a:t>
+            </a:r>
+            <a:r>
+              <a:rPr lang="nb-NO" sz="1200" dirty="0"/>
+              <a:t> </a:t>
+            </a:r>
+            <a:r>
+              <a:rPr lang="nb-NO" sz="1200" dirty="0" err="1"/>
+              <a:t>summary</a:t>
+            </a:r>
+            <a:r>
+              <a:rPr lang="nb-NO" sz="1200" dirty="0"/>
+              <a:t> </a:t>
+            </a:r>
+            <a:r>
+              <a:rPr lang="nb-NO" sz="1200" dirty="0" err="1"/>
+              <a:t>statistics</a:t>
+            </a:r>
+            <a:r>
+              <a:rPr lang="nb-NO" sz="1200" dirty="0"/>
+              <a:t> for </a:t>
+            </a:r>
+            <a:r>
+              <a:rPr lang="nb-NO" sz="1200" dirty="0" err="1"/>
+              <a:t>the</a:t>
+            </a:r>
+            <a:r>
+              <a:rPr lang="nb-NO" sz="1200" dirty="0"/>
+              <a:t> </a:t>
+            </a:r>
+            <a:r>
+              <a:rPr lang="nb-NO" sz="1200" dirty="0" err="1"/>
+              <a:t>model</a:t>
+            </a:r>
+            <a:r>
+              <a:rPr lang="nb-NO" sz="1200" dirty="0"/>
+              <a:t> and </a:t>
+            </a:r>
+            <a:r>
+              <a:rPr lang="nb-NO" sz="1200" dirty="0" err="1"/>
+              <a:t>performance</a:t>
+            </a:r>
+            <a:r>
+              <a:rPr lang="nb-NO" sz="1200" dirty="0"/>
+              <a:t> </a:t>
+            </a:r>
+            <a:r>
+              <a:rPr lang="nb-NO" sz="1200" dirty="0" err="1"/>
+              <a:t>evaluation</a:t>
+            </a:r>
+            <a:endParaRPr lang="nb-NO" sz="1200" dirty="0"/>
+          </a:p>
+          <a:p>
+            <a:pPr lvl="1"/>
+            <a:r>
+              <a:rPr lang="nb-NO" sz="1600" dirty="0"/>
+              <a:t>‘data’ : </a:t>
+            </a:r>
+            <a:r>
+              <a:rPr lang="nb-NO" sz="1600" i="1" dirty="0"/>
+              <a:t>list</a:t>
+            </a:r>
+          </a:p>
+          <a:p>
+            <a:pPr lvl="2"/>
+            <a:r>
+              <a:rPr lang="nb-NO" sz="1200" dirty="0" err="1"/>
+              <a:t>Contains</a:t>
+            </a:r>
+            <a:r>
+              <a:rPr lang="nb-NO" sz="1200" dirty="0"/>
+              <a:t> file </a:t>
+            </a:r>
+            <a:r>
+              <a:rPr lang="nb-NO" sz="1200" dirty="0" err="1"/>
+              <a:t>paths</a:t>
+            </a:r>
+            <a:r>
+              <a:rPr lang="nb-NO" sz="1200" dirty="0"/>
+              <a:t> to </a:t>
+            </a:r>
+            <a:r>
+              <a:rPr lang="nb-NO" sz="1200" dirty="0" err="1"/>
+              <a:t>the</a:t>
+            </a:r>
+            <a:r>
+              <a:rPr lang="nb-NO" sz="1200" dirty="0"/>
+              <a:t> data used for training (</a:t>
+            </a:r>
+            <a:r>
+              <a:rPr lang="nb-NO" sz="1200" dirty="0" err="1"/>
+              <a:t>maybe</a:t>
+            </a:r>
+            <a:r>
+              <a:rPr lang="nb-NO" sz="1200" dirty="0"/>
+              <a:t> </a:t>
+            </a:r>
+            <a:r>
+              <a:rPr lang="nb-NO" sz="1200" dirty="0" err="1"/>
+              <a:t>also</a:t>
+            </a:r>
+            <a:r>
+              <a:rPr lang="nb-NO" sz="1200" dirty="0"/>
+              <a:t> testing) </a:t>
+            </a:r>
+            <a:r>
+              <a:rPr lang="nb-NO" sz="1200" dirty="0" err="1"/>
+              <a:t>the</a:t>
+            </a:r>
+            <a:r>
+              <a:rPr lang="nb-NO" sz="1200" dirty="0"/>
+              <a:t> </a:t>
+            </a:r>
+            <a:r>
+              <a:rPr lang="nb-NO" sz="1200" dirty="0" err="1"/>
+              <a:t>model</a:t>
+            </a:r>
+            <a:endParaRPr lang="nb-NO" sz="1200" dirty="0"/>
+          </a:p>
+          <a:p>
+            <a:pPr lvl="2"/>
+            <a:r>
+              <a:rPr lang="nb-NO" sz="1200" dirty="0"/>
+              <a:t>In </a:t>
+            </a:r>
+            <a:r>
+              <a:rPr lang="nb-NO" sz="1200" dirty="0" err="1"/>
+              <a:t>this</a:t>
+            </a:r>
+            <a:r>
+              <a:rPr lang="nb-NO" sz="1200" dirty="0"/>
+              <a:t> </a:t>
+            </a:r>
+            <a:r>
+              <a:rPr lang="nb-NO" sz="1200" dirty="0" err="1"/>
+              <a:t>way</a:t>
+            </a:r>
+            <a:r>
+              <a:rPr lang="nb-NO" sz="1200" dirty="0"/>
+              <a:t>, </a:t>
+            </a:r>
+            <a:r>
+              <a:rPr lang="nb-NO" sz="1200" dirty="0" err="1"/>
+              <a:t>augmented</a:t>
+            </a:r>
+            <a:r>
+              <a:rPr lang="nb-NO" sz="1200" dirty="0"/>
+              <a:t> data </a:t>
+            </a:r>
+            <a:r>
+              <a:rPr lang="nb-NO" sz="1200" dirty="0" err="1"/>
+              <a:t>sets</a:t>
+            </a:r>
+            <a:r>
+              <a:rPr lang="nb-NO" sz="1200" dirty="0"/>
+              <a:t> </a:t>
+            </a:r>
+            <a:r>
+              <a:rPr lang="nb-NO" sz="1200" dirty="0" err="1"/>
+              <a:t>can</a:t>
+            </a:r>
+            <a:r>
+              <a:rPr lang="nb-NO" sz="1200" dirty="0"/>
+              <a:t> be </a:t>
+            </a:r>
+            <a:r>
+              <a:rPr lang="nb-NO" sz="1200" dirty="0" err="1"/>
+              <a:t>created</a:t>
+            </a:r>
+            <a:r>
+              <a:rPr lang="nb-NO" sz="1200" dirty="0"/>
+              <a:t> </a:t>
+            </a:r>
+            <a:r>
+              <a:rPr lang="nb-NO" sz="1200" dirty="0" err="1"/>
+              <a:t>without</a:t>
+            </a:r>
+            <a:r>
+              <a:rPr lang="nb-NO" sz="1200" dirty="0"/>
+              <a:t> </a:t>
+            </a:r>
+            <a:r>
+              <a:rPr lang="nb-NO" sz="1200" dirty="0" err="1"/>
+              <a:t>getting</a:t>
+            </a:r>
+            <a:r>
+              <a:rPr lang="nb-NO" sz="1200" dirty="0"/>
+              <a:t> </a:t>
+            </a:r>
+            <a:r>
+              <a:rPr lang="nb-NO" sz="1200" dirty="0" err="1"/>
+              <a:t>tied</a:t>
+            </a:r>
+            <a:r>
+              <a:rPr lang="nb-NO" sz="1200" dirty="0"/>
+              <a:t> to a </a:t>
+            </a:r>
+            <a:r>
+              <a:rPr lang="nb-NO" sz="1200" dirty="0" err="1"/>
+              <a:t>particular</a:t>
+            </a:r>
+            <a:r>
+              <a:rPr lang="nb-NO" sz="1200" dirty="0"/>
+              <a:t> </a:t>
+            </a:r>
+            <a:r>
+              <a:rPr lang="nb-NO" sz="1200" dirty="0" err="1"/>
+              <a:t>model</a:t>
+            </a:r>
+            <a:r>
+              <a:rPr lang="nb-NO" sz="1200" dirty="0"/>
+              <a:t> </a:t>
+            </a:r>
+            <a:r>
+              <a:rPr lang="nb-NO" sz="1200" dirty="0" err="1"/>
+              <a:t>instance</a:t>
+            </a:r>
+            <a:endParaRPr lang="nb-NO" sz="1200" dirty="0"/>
+          </a:p>
+          <a:p>
+            <a:endParaRPr lang="nb-NO" sz="1800" dirty="0"/>
+          </a:p>
+          <a:p>
+            <a:r>
+              <a:rPr lang="nb-NO" sz="1800" dirty="0"/>
+              <a:t>I </a:t>
+            </a:r>
+            <a:r>
+              <a:rPr lang="nb-NO" sz="1800" dirty="0" err="1"/>
+              <a:t>may</a:t>
+            </a:r>
+            <a:r>
+              <a:rPr lang="nb-NO" sz="1800" dirty="0"/>
+              <a:t> </a:t>
+            </a:r>
+            <a:r>
+              <a:rPr lang="nb-NO" sz="1800" dirty="0" err="1"/>
+              <a:t>decide</a:t>
+            </a:r>
+            <a:r>
+              <a:rPr lang="nb-NO" sz="1800" dirty="0"/>
+              <a:t> </a:t>
+            </a:r>
+            <a:r>
+              <a:rPr lang="nb-NO" sz="1800" dirty="0" err="1"/>
+              <a:t>on</a:t>
+            </a:r>
+            <a:r>
+              <a:rPr lang="nb-NO" sz="1800" dirty="0"/>
+              <a:t> a </a:t>
+            </a:r>
+            <a:r>
+              <a:rPr lang="nb-NO" sz="1800" dirty="0" err="1"/>
+              <a:t>better</a:t>
+            </a:r>
+            <a:r>
+              <a:rPr lang="nb-NO" sz="1800" dirty="0"/>
+              <a:t> </a:t>
+            </a:r>
+            <a:r>
+              <a:rPr lang="nb-NO" sz="1800" dirty="0" err="1"/>
+              <a:t>name</a:t>
+            </a:r>
+            <a:r>
+              <a:rPr lang="nb-NO" sz="1800" dirty="0"/>
+              <a:t> for </a:t>
+            </a:r>
+            <a:r>
+              <a:rPr lang="nb-NO" sz="1800" dirty="0" err="1"/>
+              <a:t>this</a:t>
+            </a:r>
+            <a:r>
+              <a:rPr lang="nb-NO" sz="1800" dirty="0"/>
+              <a:t> file </a:t>
+            </a:r>
+            <a:r>
+              <a:rPr lang="nb-NO" sz="1800" dirty="0" err="1"/>
+              <a:t>before</a:t>
+            </a:r>
+            <a:r>
+              <a:rPr lang="nb-NO" sz="1800" dirty="0"/>
+              <a:t> I start to </a:t>
+            </a:r>
+            <a:r>
+              <a:rPr lang="nb-NO" sz="1800" dirty="0" err="1"/>
+              <a:t>train</a:t>
+            </a:r>
+            <a:r>
+              <a:rPr lang="nb-NO" sz="1800" dirty="0"/>
+              <a:t> </a:t>
+            </a:r>
+            <a:r>
+              <a:rPr lang="nb-NO" sz="1800" dirty="0" err="1"/>
+              <a:t>the</a:t>
+            </a:r>
+            <a:r>
+              <a:rPr lang="nb-NO" sz="1800" dirty="0"/>
+              <a:t> </a:t>
+            </a:r>
+            <a:r>
+              <a:rPr lang="nb-NO" sz="1800" dirty="0" err="1"/>
+              <a:t>models</a:t>
+            </a:r>
+            <a:r>
+              <a:rPr lang="nb-NO" sz="1800" dirty="0"/>
+              <a:t>…</a:t>
+            </a:r>
+          </a:p>
+          <a:p>
+            <a:pPr lvl="2"/>
+            <a:endParaRPr lang="en-GB" sz="1200" dirty="0"/>
           </a:p>
         </p:txBody>
       </p:sp>
@@ -9084,10 +9507,85 @@
               <a:t> in folders by </a:t>
             </a:r>
             <a:r>
-              <a:rPr lang="nb-NO" sz="1600" dirty="0" err="1"/>
+              <a:rPr lang="nb-NO" sz="1600" i="1" dirty="0" err="1"/>
               <a:t>datetime</a:t>
             </a:r>
-            <a:endParaRPr lang="nb-NO" sz="1600" dirty="0"/>
+            <a:endParaRPr lang="nb-NO" sz="1600" i="1" dirty="0"/>
+          </a:p>
+          <a:p>
+            <a:pPr lvl="2"/>
+            <a:r>
+              <a:rPr lang="nb-NO" sz="1200" dirty="0" err="1"/>
+              <a:t>That</a:t>
+            </a:r>
+            <a:r>
+              <a:rPr lang="nb-NO" sz="1200" dirty="0"/>
+              <a:t> </a:t>
+            </a:r>
+            <a:r>
+              <a:rPr lang="nb-NO" sz="1200" dirty="0" err="1"/>
+              <a:t>way</a:t>
+            </a:r>
+            <a:r>
+              <a:rPr lang="nb-NO" sz="1200" dirty="0"/>
+              <a:t>, all </a:t>
+            </a:r>
+            <a:r>
+              <a:rPr lang="nb-NO" sz="1200" dirty="0" err="1"/>
+              <a:t>models</a:t>
+            </a:r>
+            <a:r>
+              <a:rPr lang="nb-NO" sz="1200" dirty="0"/>
+              <a:t> </a:t>
+            </a:r>
+            <a:r>
+              <a:rPr lang="nb-NO" sz="1200" dirty="0" err="1"/>
+              <a:t>will</a:t>
+            </a:r>
+            <a:r>
+              <a:rPr lang="nb-NO" sz="1200" dirty="0"/>
+              <a:t> have </a:t>
+            </a:r>
+            <a:r>
+              <a:rPr lang="nb-NO" sz="1200" dirty="0" err="1"/>
+              <a:t>unique</a:t>
+            </a:r>
+            <a:r>
+              <a:rPr lang="nb-NO" sz="1200" dirty="0"/>
+              <a:t> </a:t>
+            </a:r>
+            <a:r>
+              <a:rPr lang="nb-NO" sz="1200" dirty="0" err="1"/>
+              <a:t>names</a:t>
+            </a:r>
+            <a:r>
+              <a:rPr lang="nb-NO" sz="1200" dirty="0"/>
+              <a:t>; </a:t>
+            </a:r>
+            <a:r>
+              <a:rPr lang="nb-NO" sz="1200" b="1" dirty="0" err="1"/>
+              <a:t>Maybe</a:t>
+            </a:r>
+            <a:r>
+              <a:rPr lang="nb-NO" sz="1200" b="1" dirty="0"/>
+              <a:t> I </a:t>
+            </a:r>
+            <a:r>
+              <a:rPr lang="nb-NO" sz="1200" b="1" dirty="0" err="1"/>
+              <a:t>should</a:t>
+            </a:r>
+            <a:r>
+              <a:rPr lang="nb-NO" sz="1200" b="1" dirty="0"/>
+              <a:t> </a:t>
+            </a:r>
+            <a:r>
+              <a:rPr lang="nb-NO" sz="1200" b="1" dirty="0" err="1"/>
+              <a:t>create</a:t>
+            </a:r>
+            <a:r>
+              <a:rPr lang="nb-NO" sz="1200" b="1" dirty="0"/>
+              <a:t> a UID</a:t>
+            </a:r>
           </a:p>
           <a:p>
             <a:pPr lvl="1"/>

</xml_diff>